<commit_message>
update analysis without deep samples and salmonidae
</commit_message>
<xml_diff>
--- a/outputs/00_Figures_for_paper/Figure5.pptx
+++ b/outputs/00_Figures_for_paper/Figure5.pptx
@@ -243,7 +243,7 @@
           <a:p>
             <a:fld id="{CF97A134-FB87-44B0-94D1-6D4AE8ED7871}" type="datetimeFigureOut">
               <a:rPr lang="fr-FR" smtClean="0"/>
-              <a:t>06/04/2021</a:t>
+              <a:t>16/06/2021</a:t>
             </a:fld>
             <a:endParaRPr lang="fr-FR"/>
           </a:p>
@@ -413,7 +413,7 @@
           <a:p>
             <a:fld id="{CF97A134-FB87-44B0-94D1-6D4AE8ED7871}" type="datetimeFigureOut">
               <a:rPr lang="fr-FR" smtClean="0"/>
-              <a:t>06/04/2021</a:t>
+              <a:t>16/06/2021</a:t>
             </a:fld>
             <a:endParaRPr lang="fr-FR"/>
           </a:p>
@@ -593,7 +593,7 @@
           <a:p>
             <a:fld id="{CF97A134-FB87-44B0-94D1-6D4AE8ED7871}" type="datetimeFigureOut">
               <a:rPr lang="fr-FR" smtClean="0"/>
-              <a:t>06/04/2021</a:t>
+              <a:t>16/06/2021</a:t>
             </a:fld>
             <a:endParaRPr lang="fr-FR"/>
           </a:p>
@@ -763,7 +763,7 @@
           <a:p>
             <a:fld id="{CF97A134-FB87-44B0-94D1-6D4AE8ED7871}" type="datetimeFigureOut">
               <a:rPr lang="fr-FR" smtClean="0"/>
-              <a:t>06/04/2021</a:t>
+              <a:t>16/06/2021</a:t>
             </a:fld>
             <a:endParaRPr lang="fr-FR"/>
           </a:p>
@@ -1007,7 +1007,7 @@
           <a:p>
             <a:fld id="{CF97A134-FB87-44B0-94D1-6D4AE8ED7871}" type="datetimeFigureOut">
               <a:rPr lang="fr-FR" smtClean="0"/>
-              <a:t>06/04/2021</a:t>
+              <a:t>16/06/2021</a:t>
             </a:fld>
             <a:endParaRPr lang="fr-FR"/>
           </a:p>
@@ -1239,7 +1239,7 @@
           <a:p>
             <a:fld id="{CF97A134-FB87-44B0-94D1-6D4AE8ED7871}" type="datetimeFigureOut">
               <a:rPr lang="fr-FR" smtClean="0"/>
-              <a:t>06/04/2021</a:t>
+              <a:t>16/06/2021</a:t>
             </a:fld>
             <a:endParaRPr lang="fr-FR"/>
           </a:p>
@@ -1606,7 +1606,7 @@
           <a:p>
             <a:fld id="{CF97A134-FB87-44B0-94D1-6D4AE8ED7871}" type="datetimeFigureOut">
               <a:rPr lang="fr-FR" smtClean="0"/>
-              <a:t>06/04/2021</a:t>
+              <a:t>16/06/2021</a:t>
             </a:fld>
             <a:endParaRPr lang="fr-FR"/>
           </a:p>
@@ -1724,7 +1724,7 @@
           <a:p>
             <a:fld id="{CF97A134-FB87-44B0-94D1-6D4AE8ED7871}" type="datetimeFigureOut">
               <a:rPr lang="fr-FR" smtClean="0"/>
-              <a:t>06/04/2021</a:t>
+              <a:t>16/06/2021</a:t>
             </a:fld>
             <a:endParaRPr lang="fr-FR"/>
           </a:p>
@@ -1819,7 +1819,7 @@
           <a:p>
             <a:fld id="{CF97A134-FB87-44B0-94D1-6D4AE8ED7871}" type="datetimeFigureOut">
               <a:rPr lang="fr-FR" smtClean="0"/>
-              <a:t>06/04/2021</a:t>
+              <a:t>16/06/2021</a:t>
             </a:fld>
             <a:endParaRPr lang="fr-FR"/>
           </a:p>
@@ -2096,7 +2096,7 @@
           <a:p>
             <a:fld id="{CF97A134-FB87-44B0-94D1-6D4AE8ED7871}" type="datetimeFigureOut">
               <a:rPr lang="fr-FR" smtClean="0"/>
-              <a:t>06/04/2021</a:t>
+              <a:t>16/06/2021</a:t>
             </a:fld>
             <a:endParaRPr lang="fr-FR"/>
           </a:p>
@@ -2353,7 +2353,7 @@
           <a:p>
             <a:fld id="{CF97A134-FB87-44B0-94D1-6D4AE8ED7871}" type="datetimeFigureOut">
               <a:rPr lang="fr-FR" smtClean="0"/>
-              <a:t>06/04/2021</a:t>
+              <a:t>16/06/2021</a:t>
             </a:fld>
             <a:endParaRPr lang="fr-FR"/>
           </a:p>
@@ -2566,7 +2566,7 @@
           <a:p>
             <a:fld id="{CF97A134-FB87-44B0-94D1-6D4AE8ED7871}" type="datetimeFigureOut">
               <a:rPr lang="fr-FR" smtClean="0"/>
-              <a:t>06/04/2021</a:t>
+              <a:t>16/06/2021</a:t>
             </a:fld>
             <a:endParaRPr lang="fr-FR"/>
           </a:p>
@@ -2973,16 +2973,16 @@
       </p:grpSpPr>
       <p:grpSp>
         <p:nvGrpSpPr>
-          <p:cNvPr id="6" name="Groupe 5"/>
+          <p:cNvPr id="2" name="Groupe 1"/>
           <p:cNvGrpSpPr/>
           <p:nvPr/>
         </p:nvGrpSpPr>
         <p:grpSpPr>
           <a:xfrm>
-            <a:off x="256009" y="8873319"/>
-            <a:ext cx="9930565" cy="4560495"/>
-            <a:chOff x="256009" y="8873319"/>
-            <a:chExt cx="9930565" cy="4560495"/>
+            <a:off x="369651" y="8873319"/>
+            <a:ext cx="9200197" cy="4560495"/>
+            <a:chOff x="369651" y="8873319"/>
+            <a:chExt cx="9200197" cy="4560495"/>
           </a:xfrm>
         </p:grpSpPr>
         <p:pic>
@@ -2994,7 +2994,7 @@
             <p:nvPr/>
           </p:nvPicPr>
           <p:blipFill>
-            <a:blip r:embed="rId2" cstate="print">
+            <a:blip r:embed="rId2">
               <a:extLst>
                 <a:ext uri="{28A0092B-C50C-407E-A947-70E740481C1C}">
                   <a14:useLocalDpi xmlns:a14="http://schemas.microsoft.com/office/drawing/2010/main" val="0"/>
@@ -3007,8 +3007,8 @@
           </p:blipFill>
           <p:spPr>
             <a:xfrm>
-              <a:off x="256009" y="8873319"/>
-              <a:ext cx="9930565" cy="4560495"/>
+              <a:off x="369651" y="8873319"/>
+              <a:ext cx="9200197" cy="4560495"/>
             </a:xfrm>
             <a:prstGeom prst="rect">
               <a:avLst/>
@@ -3023,8 +3023,8 @@
           </p:nvSpPr>
           <p:spPr>
             <a:xfrm>
-              <a:off x="637973" y="9257069"/>
-              <a:ext cx="302609" cy="261610"/>
+              <a:off x="694643" y="9257069"/>
+              <a:ext cx="366521" cy="261610"/>
             </a:xfrm>
             <a:prstGeom prst="rect">
               <a:avLst/>
@@ -4141,8 +4141,8 @@
           </a:p>
         </p:txBody>
       </p:sp>
-      <mc:AlternateContent xmlns:mc="http://schemas.openxmlformats.org/markup-compatibility/2006" xmlns:a14="http://schemas.microsoft.com/office/drawing/2010/main">
-        <mc:Choice Requires="a14">
+      <mc:AlternateContent xmlns:mc="http://schemas.openxmlformats.org/markup-compatibility/2006">
+        <mc:Choice xmlns:a14="http://schemas.microsoft.com/office/drawing/2010/main" Requires="a14">
           <p:sp>
             <p:nvSpPr>
               <p:cNvPr id="49" name="ZoneTexte 48"/>
@@ -4227,13 +4227,29 @@
                     <a:ea typeface="Cambria Math" panose="02040503050406030204" pitchFamily="18" charset="0"/>
                     <a:cs typeface="Arial" panose="020B0604020202020204" pitchFamily="34" charset="0"/>
                   </a:rPr>
-                  <a:t>(2116 MOTUs)</a:t>
+                  <a:t>(</a:t>
+                </a:r>
+                <a:r>
+                  <a:rPr lang="fr-FR" sz="1400" b="1" dirty="0" smtClean="0">
+                    <a:latin typeface="Cambria Math" panose="02040503050406030204" pitchFamily="18" charset="0"/>
+                    <a:ea typeface="Cambria Math" panose="02040503050406030204" pitchFamily="18" charset="0"/>
+                    <a:cs typeface="Arial" panose="020B0604020202020204" pitchFamily="34" charset="0"/>
+                  </a:rPr>
+                  <a:t>2023 </a:t>
+                </a:r>
+                <a:r>
+                  <a:rPr lang="fr-FR" sz="1400" b="1" dirty="0" smtClean="0">
+                    <a:latin typeface="Cambria Math" panose="02040503050406030204" pitchFamily="18" charset="0"/>
+                    <a:ea typeface="Cambria Math" panose="02040503050406030204" pitchFamily="18" charset="0"/>
+                    <a:cs typeface="Arial" panose="020B0604020202020204" pitchFamily="34" charset="0"/>
+                  </a:rPr>
+                  <a:t>MOTUs)</a:t>
                 </a:r>
               </a:p>
             </p:txBody>
           </p:sp>
         </mc:Choice>
-        <mc:Fallback xmlns="">
+        <mc:Fallback>
           <p:sp>
             <p:nvSpPr>
               <p:cNvPr id="49" name="ZoneTexte 48"/>
@@ -4272,8 +4288,8 @@
           </p:sp>
         </mc:Fallback>
       </mc:AlternateContent>
-      <mc:AlternateContent xmlns:mc="http://schemas.openxmlformats.org/markup-compatibility/2006" xmlns:a14="http://schemas.microsoft.com/office/drawing/2010/main">
-        <mc:Choice Requires="a14">
+      <mc:AlternateContent xmlns:mc="http://schemas.openxmlformats.org/markup-compatibility/2006">
+        <mc:Choice xmlns:a14="http://schemas.microsoft.com/office/drawing/2010/main" Requires="a14">
           <p:sp>
             <p:nvSpPr>
               <p:cNvPr id="50" name="ZoneTexte 49"/>
@@ -4351,7 +4367,19 @@
                         <a:rPr lang="fr-FR" sz="1600" b="1" i="1" smtClean="0">
                           <a:latin typeface="Cambria Math" panose="02040503050406030204" pitchFamily="18" charset="0"/>
                         </a:rPr>
-                        <m:t>𝟕𝟒</m:t>
+                        <m:t>𝟕𝟑</m:t>
+                      </m:r>
+                      <m:r>
+                        <a:rPr lang="fr-FR" sz="1600" b="1" i="1" smtClean="0">
+                          <a:latin typeface="Cambria Math" panose="02040503050406030204" pitchFamily="18" charset="0"/>
+                        </a:rPr>
+                        <m:t>,</m:t>
+                      </m:r>
+                      <m:r>
+                        <a:rPr lang="fr-FR" sz="1600" b="1" i="1" smtClean="0">
+                          <a:latin typeface="Cambria Math" panose="02040503050406030204" pitchFamily="18" charset="0"/>
+                        </a:rPr>
+                        <m:t>𝟕</m:t>
                       </m:r>
                       <m:r>
                         <a:rPr lang="fr-FR" sz="1600" b="1" i="1" smtClean="0">
@@ -4370,7 +4398,7 @@
             </p:txBody>
           </p:sp>
         </mc:Choice>
-        <mc:Fallback xmlns="">
+        <mc:Fallback>
           <p:sp>
             <p:nvSpPr>
               <p:cNvPr id="50" name="ZoneTexte 49"/>
@@ -4409,8 +4437,8 @@
           </p:sp>
         </mc:Fallback>
       </mc:AlternateContent>
-      <mc:AlternateContent xmlns:mc="http://schemas.openxmlformats.org/markup-compatibility/2006" xmlns:a14="http://schemas.microsoft.com/office/drawing/2010/main">
-        <mc:Choice Requires="a14">
+      <mc:AlternateContent xmlns:mc="http://schemas.openxmlformats.org/markup-compatibility/2006">
+        <mc:Choice xmlns:a14="http://schemas.microsoft.com/office/drawing/2010/main" Requires="a14">
           <p:sp>
             <p:nvSpPr>
               <p:cNvPr id="51" name="ZoneTexte 50"/>
@@ -4512,7 +4540,7 @@
                         <a:rPr lang="fr-FR" sz="1600" b="1" i="1" smtClean="0">
                           <a:latin typeface="Cambria Math" panose="02040503050406030204" pitchFamily="18" charset="0"/>
                         </a:rPr>
-                        <m:t>𝟓</m:t>
+                        <m:t>𝟖</m:t>
                       </m:r>
                       <m:r>
                         <a:rPr lang="fr-FR" sz="1600" b="1" i="1" smtClean="0">
@@ -4531,7 +4559,7 @@
             </p:txBody>
           </p:sp>
         </mc:Choice>
-        <mc:Fallback xmlns="">
+        <mc:Fallback>
           <p:sp>
             <p:nvSpPr>
               <p:cNvPr id="51" name="ZoneTexte 50"/>
@@ -4570,8 +4598,8 @@
           </p:sp>
         </mc:Fallback>
       </mc:AlternateContent>
-      <mc:AlternateContent xmlns:mc="http://schemas.openxmlformats.org/markup-compatibility/2006" xmlns:a14="http://schemas.microsoft.com/office/drawing/2010/main">
-        <mc:Choice Requires="a14">
+      <mc:AlternateContent xmlns:mc="http://schemas.openxmlformats.org/markup-compatibility/2006">
+        <mc:Choice xmlns:a14="http://schemas.microsoft.com/office/drawing/2010/main" Requires="a14">
           <p:sp>
             <p:nvSpPr>
               <p:cNvPr id="52" name="ZoneTexte 51"/>
@@ -4661,7 +4689,7 @@
                         <a:rPr lang="fr-FR" sz="1600" b="1" i="1" smtClean="0">
                           <a:latin typeface="Cambria Math" panose="02040503050406030204" pitchFamily="18" charset="0"/>
                         </a:rPr>
-                        <m:t>𝟔</m:t>
+                        <m:t>𝟓</m:t>
                       </m:r>
                       <m:r>
                         <a:rPr lang="fr-FR" sz="1600" b="1" i="1" smtClean="0">
@@ -4673,7 +4701,7 @@
                         <a:rPr lang="fr-FR" sz="1600" b="1" i="1" smtClean="0">
                           <a:latin typeface="Cambria Math" panose="02040503050406030204" pitchFamily="18" charset="0"/>
                         </a:rPr>
-                        <m:t>𝟐</m:t>
+                        <m:t>𝟗</m:t>
                       </m:r>
                       <m:r>
                         <a:rPr lang="fr-FR" sz="1600" b="1" i="1" smtClean="0">
@@ -4692,7 +4720,7 @@
             </p:txBody>
           </p:sp>
         </mc:Choice>
-        <mc:Fallback xmlns="">
+        <mc:Fallback>
           <p:sp>
             <p:nvSpPr>
               <p:cNvPr id="52" name="ZoneTexte 51"/>
@@ -4731,8 +4759,8 @@
           </p:sp>
         </mc:Fallback>
       </mc:AlternateContent>
-      <mc:AlternateContent xmlns:mc="http://schemas.openxmlformats.org/markup-compatibility/2006" xmlns:a14="http://schemas.microsoft.com/office/drawing/2010/main">
-        <mc:Choice Requires="a14">
+      <mc:AlternateContent xmlns:mc="http://schemas.openxmlformats.org/markup-compatibility/2006">
+        <mc:Choice xmlns:a14="http://schemas.microsoft.com/office/drawing/2010/main" Requires="a14">
           <p:sp>
             <p:nvSpPr>
               <p:cNvPr id="53" name="ZoneTexte 52"/>
@@ -4822,7 +4850,7 @@
                         <a:rPr lang="fr-FR" sz="1600" b="1" i="1" smtClean="0">
                           <a:latin typeface="Cambria Math" panose="02040503050406030204" pitchFamily="18" charset="0"/>
                         </a:rPr>
-                        <m:t>𝟑</m:t>
+                        <m:t>𝟕</m:t>
                       </m:r>
                       <m:r>
                         <a:rPr lang="fr-FR" sz="1600" b="1" i="1" smtClean="0">
@@ -4841,7 +4869,7 @@
             </p:txBody>
           </p:sp>
         </mc:Choice>
-        <mc:Fallback xmlns="">
+        <mc:Fallback>
           <p:sp>
             <p:nvSpPr>
               <p:cNvPr id="53" name="ZoneTexte 52"/>
@@ -4939,7 +4967,7 @@
         <p:spPr>
           <a:xfrm>
             <a:off x="765365" y="475442"/>
-            <a:ext cx="10304711" cy="5724839"/>
+            <a:ext cx="10304711" cy="5724838"/>
           </a:xfrm>
           <a:prstGeom prst="rect">
             <a:avLst/>

</xml_diff>